<commit_message>
Update Template Design Pattern.pptx
</commit_message>
<xml_diff>
--- a/Design Patterns/Template Design Pattern.pptx
+++ b/Design Patterns/Template Design Pattern.pptx
@@ -1038,7 +1038,7 @@
           <a:noFill/>
           <a:extLst>
             <a:ext uri="{909E8E84-426E-40dd-AFC4-6F175D3DCCD1}">
-              <a14:hiddenFill xmlns:a14="http://schemas.microsoft.com/office/drawing/2010/main" xmlns="">
+              <a14:hiddenFill xmlns="" xmlns:a14="http://schemas.microsoft.com/office/drawing/2010/main">
                 <a:solidFill>
                   <a:srgbClr val="FFFFFF"/>
                 </a:solidFill>
@@ -1097,7 +1097,7 @@
             </a:ln>
             <a:extLst>
               <a:ext uri="{91240B29-F687-4f45-9708-019B960494DF}">
-                <a14:hiddenLine xmlns:a14="http://schemas.microsoft.com/office/drawing/2010/main" xmlns="" w="9525">
+                <a14:hiddenLine xmlns="" xmlns:a14="http://schemas.microsoft.com/office/drawing/2010/main" w="9525">
                   <a:solidFill>
                     <a:srgbClr val="000000"/>
                   </a:solidFill>
@@ -1187,7 +1187,7 @@
             </a:ln>
             <a:extLst>
               <a:ext uri="{91240B29-F687-4f45-9708-019B960494DF}">
-                <a14:hiddenLine xmlns:a14="http://schemas.microsoft.com/office/drawing/2010/main" xmlns="" w="9525">
+                <a14:hiddenLine xmlns="" xmlns:a14="http://schemas.microsoft.com/office/drawing/2010/main" w="9525">
                   <a:solidFill>
                     <a:srgbClr val="000000"/>
                   </a:solidFill>
@@ -1277,7 +1277,7 @@
             </a:ln>
             <a:extLst>
               <a:ext uri="{91240B29-F687-4f45-9708-019B960494DF}">
-                <a14:hiddenLine xmlns:a14="http://schemas.microsoft.com/office/drawing/2010/main" xmlns="" w="9525">
+                <a14:hiddenLine xmlns="" xmlns:a14="http://schemas.microsoft.com/office/drawing/2010/main" w="9525">
                   <a:solidFill>
                     <a:srgbClr val="000000"/>
                   </a:solidFill>
@@ -1311,7 +1311,7 @@
             </a:ln>
             <a:extLst>
               <a:ext uri="{91240B29-F687-4f45-9708-019B960494DF}">
-                <a14:hiddenLine xmlns:a14="http://schemas.microsoft.com/office/drawing/2010/main" xmlns="" w="9525">
+                <a14:hiddenLine xmlns="" xmlns:a14="http://schemas.microsoft.com/office/drawing/2010/main" w="9525">
                   <a:solidFill>
                     <a:srgbClr val="000000"/>
                   </a:solidFill>
@@ -1401,7 +1401,7 @@
             </a:ln>
             <a:extLst>
               <a:ext uri="{91240B29-F687-4f45-9708-019B960494DF}">
-                <a14:hiddenLine xmlns:a14="http://schemas.microsoft.com/office/drawing/2010/main" xmlns="" w="9525">
+                <a14:hiddenLine xmlns="" xmlns:a14="http://schemas.microsoft.com/office/drawing/2010/main" w="9525">
                   <a:solidFill>
                     <a:srgbClr val="000000"/>
                   </a:solidFill>
@@ -1463,7 +1463,7 @@
             </a:ln>
             <a:extLst>
               <a:ext uri="{91240B29-F687-4f45-9708-019B960494DF}">
-                <a14:hiddenLine xmlns:a14="http://schemas.microsoft.com/office/drawing/2010/main" xmlns="" w="9525">
+                <a14:hiddenLine xmlns="" xmlns:a14="http://schemas.microsoft.com/office/drawing/2010/main" w="9525">
                   <a:solidFill>
                     <a:srgbClr val="000000"/>
                   </a:solidFill>
@@ -1525,7 +1525,7 @@
             </a:ln>
             <a:extLst>
               <a:ext uri="{91240B29-F687-4f45-9708-019B960494DF}">
-                <a14:hiddenLine xmlns:a14="http://schemas.microsoft.com/office/drawing/2010/main" xmlns="" w="9525">
+                <a14:hiddenLine xmlns="" xmlns:a14="http://schemas.microsoft.com/office/drawing/2010/main" w="9525">
                   <a:solidFill>
                     <a:srgbClr val="000000"/>
                   </a:solidFill>
@@ -1615,7 +1615,7 @@
             </a:ln>
             <a:extLst>
               <a:ext uri="{91240B29-F687-4f45-9708-019B960494DF}">
-                <a14:hiddenLine xmlns:a14="http://schemas.microsoft.com/office/drawing/2010/main" xmlns="" w="9525">
+                <a14:hiddenLine xmlns="" xmlns:a14="http://schemas.microsoft.com/office/drawing/2010/main" w="9525">
                   <a:solidFill>
                     <a:srgbClr val="000000"/>
                   </a:solidFill>
@@ -1677,7 +1677,7 @@
             </a:ln>
             <a:extLst>
               <a:ext uri="{91240B29-F687-4f45-9708-019B960494DF}">
-                <a14:hiddenLine xmlns:a14="http://schemas.microsoft.com/office/drawing/2010/main" xmlns="" w="9525">
+                <a14:hiddenLine xmlns="" xmlns:a14="http://schemas.microsoft.com/office/drawing/2010/main" w="9525">
                   <a:solidFill>
                     <a:srgbClr val="000000"/>
                   </a:solidFill>
@@ -1739,7 +1739,7 @@
             </a:ln>
             <a:extLst>
               <a:ext uri="{91240B29-F687-4f45-9708-019B960494DF}">
-                <a14:hiddenLine xmlns:a14="http://schemas.microsoft.com/office/drawing/2010/main" xmlns="" w="9525">
+                <a14:hiddenLine xmlns="" xmlns:a14="http://schemas.microsoft.com/office/drawing/2010/main" w="9525">
                   <a:solidFill>
                     <a:srgbClr val="000000"/>
                   </a:solidFill>
@@ -1829,7 +1829,7 @@
             </a:ln>
             <a:extLst>
               <a:ext uri="{91240B29-F687-4f45-9708-019B960494DF}">
-                <a14:hiddenLine xmlns:a14="http://schemas.microsoft.com/office/drawing/2010/main" xmlns="" w="9525">
+                <a14:hiddenLine xmlns="" xmlns:a14="http://schemas.microsoft.com/office/drawing/2010/main" w="9525">
                   <a:solidFill>
                     <a:srgbClr val="000000"/>
                   </a:solidFill>
@@ -1919,7 +1919,7 @@
             </a:ln>
             <a:extLst>
               <a:ext uri="{91240B29-F687-4f45-9708-019B960494DF}">
-                <a14:hiddenLine xmlns:a14="http://schemas.microsoft.com/office/drawing/2010/main" xmlns="" w="9525">
+                <a14:hiddenLine xmlns="" xmlns:a14="http://schemas.microsoft.com/office/drawing/2010/main" w="9525">
                   <a:solidFill>
                     <a:srgbClr val="000000"/>
                   </a:solidFill>
@@ -1981,7 +1981,7 @@
             </a:ln>
             <a:extLst>
               <a:ext uri="{91240B29-F687-4f45-9708-019B960494DF}">
-                <a14:hiddenLine xmlns:a14="http://schemas.microsoft.com/office/drawing/2010/main" xmlns="" w="9525">
+                <a14:hiddenLine xmlns="" xmlns:a14="http://schemas.microsoft.com/office/drawing/2010/main" w="9525">
                   <a:solidFill>
                     <a:srgbClr val="000000"/>
                   </a:solidFill>
@@ -2091,7 +2091,7 @@
             </a:ln>
             <a:extLst>
               <a:ext uri="{91240B29-F687-4f45-9708-019B960494DF}">
-                <a14:hiddenLine xmlns:a14="http://schemas.microsoft.com/office/drawing/2010/main" xmlns="" w="9525">
+                <a14:hiddenLine xmlns="" xmlns:a14="http://schemas.microsoft.com/office/drawing/2010/main" w="9525">
                   <a:solidFill>
                     <a:srgbClr val="000000"/>
                   </a:solidFill>
@@ -2153,7 +2153,7 @@
             </a:ln>
             <a:extLst>
               <a:ext uri="{91240B29-F687-4f45-9708-019B960494DF}">
-                <a14:hiddenLine xmlns:a14="http://schemas.microsoft.com/office/drawing/2010/main" xmlns="" w="9525">
+                <a14:hiddenLine xmlns="" xmlns:a14="http://schemas.microsoft.com/office/drawing/2010/main" w="9525">
                   <a:solidFill>
                     <a:srgbClr val="000000"/>
                   </a:solidFill>
@@ -2243,7 +2243,7 @@
             </a:ln>
             <a:extLst>
               <a:ext uri="{91240B29-F687-4f45-9708-019B960494DF}">
-                <a14:hiddenLine xmlns:a14="http://schemas.microsoft.com/office/drawing/2010/main" xmlns="" w="9525">
+                <a14:hiddenLine xmlns="" xmlns:a14="http://schemas.microsoft.com/office/drawing/2010/main" w="9525">
                   <a:solidFill>
                     <a:srgbClr val="000000"/>
                   </a:solidFill>
@@ -2333,7 +2333,7 @@
             </a:ln>
             <a:extLst>
               <a:ext uri="{91240B29-F687-4f45-9708-019B960494DF}">
-                <a14:hiddenLine xmlns:a14="http://schemas.microsoft.com/office/drawing/2010/main" xmlns="" w="9525">
+                <a14:hiddenLine xmlns="" xmlns:a14="http://schemas.microsoft.com/office/drawing/2010/main" w="9525">
                   <a:solidFill>
                     <a:srgbClr val="000000"/>
                   </a:solidFill>
@@ -2395,7 +2395,7 @@
             </a:ln>
             <a:extLst>
               <a:ext uri="{91240B29-F687-4f45-9708-019B960494DF}">
-                <a14:hiddenLine xmlns:a14="http://schemas.microsoft.com/office/drawing/2010/main" xmlns="" w="9525">
+                <a14:hiddenLine xmlns="" xmlns:a14="http://schemas.microsoft.com/office/drawing/2010/main" w="9525">
                   <a:solidFill>
                     <a:srgbClr val="000000"/>
                   </a:solidFill>
@@ -2485,7 +2485,7 @@
             </a:ln>
             <a:extLst>
               <a:ext uri="{91240B29-F687-4f45-9708-019B960494DF}">
-                <a14:hiddenLine xmlns:a14="http://schemas.microsoft.com/office/drawing/2010/main" xmlns="" w="9525">
+                <a14:hiddenLine xmlns="" xmlns:a14="http://schemas.microsoft.com/office/drawing/2010/main" w="9525">
                   <a:solidFill>
                     <a:srgbClr val="000000"/>
                   </a:solidFill>
@@ -2575,7 +2575,7 @@
             </a:ln>
             <a:extLst>
               <a:ext uri="{91240B29-F687-4f45-9708-019B960494DF}">
-                <a14:hiddenLine xmlns:a14="http://schemas.microsoft.com/office/drawing/2010/main" xmlns="" w="9525">
+                <a14:hiddenLine xmlns="" xmlns:a14="http://schemas.microsoft.com/office/drawing/2010/main" w="9525">
                   <a:solidFill>
                     <a:srgbClr val="000000"/>
                   </a:solidFill>
@@ -2631,7 +2631,7 @@
             </a:ln>
             <a:extLst>
               <a:ext uri="{91240B29-F687-4f45-9708-019B960494DF}">
-                <a14:hiddenLine xmlns:a14="http://schemas.microsoft.com/office/drawing/2010/main" xmlns="" w="9525">
+                <a14:hiddenLine xmlns="" xmlns:a14="http://schemas.microsoft.com/office/drawing/2010/main" w="9525">
                   <a:solidFill>
                     <a:srgbClr val="000000"/>
                   </a:solidFill>
@@ -2721,7 +2721,7 @@
             </a:ln>
             <a:extLst>
               <a:ext uri="{91240B29-F687-4f45-9708-019B960494DF}">
-                <a14:hiddenLine xmlns:a14="http://schemas.microsoft.com/office/drawing/2010/main" xmlns="" w="9525">
+                <a14:hiddenLine xmlns="" xmlns:a14="http://schemas.microsoft.com/office/drawing/2010/main" w="9525">
                   <a:solidFill>
                     <a:srgbClr val="000000"/>
                   </a:solidFill>
@@ -2777,7 +2777,7 @@
             </a:ln>
             <a:extLst>
               <a:ext uri="{91240B29-F687-4f45-9708-019B960494DF}">
-                <a14:hiddenLine xmlns:a14="http://schemas.microsoft.com/office/drawing/2010/main" xmlns="" w="9525">
+                <a14:hiddenLine xmlns="" xmlns:a14="http://schemas.microsoft.com/office/drawing/2010/main" w="9525">
                   <a:solidFill>
                     <a:srgbClr val="000000"/>
                   </a:solidFill>
@@ -2867,7 +2867,7 @@
             </a:ln>
             <a:extLst>
               <a:ext uri="{91240B29-F687-4f45-9708-019B960494DF}">
-                <a14:hiddenLine xmlns:a14="http://schemas.microsoft.com/office/drawing/2010/main" xmlns="" w="9525">
+                <a14:hiddenLine xmlns="" xmlns:a14="http://schemas.microsoft.com/office/drawing/2010/main" w="9525">
                   <a:solidFill>
                     <a:srgbClr val="000000"/>
                   </a:solidFill>
@@ -2935,7 +2935,7 @@
             </a:ln>
             <a:extLst>
               <a:ext uri="{91240B29-F687-4f45-9708-019B960494DF}">
-                <a14:hiddenLine xmlns:a14="http://schemas.microsoft.com/office/drawing/2010/main" xmlns="" w="9525">
+                <a14:hiddenLine xmlns="" xmlns:a14="http://schemas.microsoft.com/office/drawing/2010/main" w="9525">
                   <a:solidFill>
                     <a:srgbClr val="000000"/>
                   </a:solidFill>
@@ -3025,7 +3025,7 @@
             </a:ln>
             <a:extLst>
               <a:ext uri="{91240B29-F687-4f45-9708-019B960494DF}">
-                <a14:hiddenLine xmlns:a14="http://schemas.microsoft.com/office/drawing/2010/main" xmlns="" w="9525">
+                <a14:hiddenLine xmlns="" xmlns:a14="http://schemas.microsoft.com/office/drawing/2010/main" w="9525">
                   <a:solidFill>
                     <a:srgbClr val="000000"/>
                   </a:solidFill>
@@ -3093,7 +3093,7 @@
             </a:ln>
             <a:extLst>
               <a:ext uri="{91240B29-F687-4f45-9708-019B960494DF}">
-                <a14:hiddenLine xmlns:a14="http://schemas.microsoft.com/office/drawing/2010/main" xmlns="" w="9525">
+                <a14:hiddenLine xmlns="" xmlns:a14="http://schemas.microsoft.com/office/drawing/2010/main" w="9525">
                   <a:solidFill>
                     <a:srgbClr val="000000"/>
                   </a:solidFill>
@@ -3183,7 +3183,7 @@
             </a:ln>
             <a:extLst>
               <a:ext uri="{91240B29-F687-4f45-9708-019B960494DF}">
-                <a14:hiddenLine xmlns:a14="http://schemas.microsoft.com/office/drawing/2010/main" xmlns="" w="9525">
+                <a14:hiddenLine xmlns="" xmlns:a14="http://schemas.microsoft.com/office/drawing/2010/main" w="9525">
                   <a:solidFill>
                     <a:srgbClr val="000000"/>
                   </a:solidFill>
@@ -3217,7 +3217,7 @@
             </a:ln>
             <a:extLst>
               <a:ext uri="{91240B29-F687-4f45-9708-019B960494DF}">
-                <a14:hiddenLine xmlns:a14="http://schemas.microsoft.com/office/drawing/2010/main" xmlns="" w="9525">
+                <a14:hiddenLine xmlns="" xmlns:a14="http://schemas.microsoft.com/office/drawing/2010/main" w="9525">
                   <a:solidFill>
                     <a:srgbClr val="000000"/>
                   </a:solidFill>
@@ -3307,7 +3307,7 @@
             </a:ln>
             <a:extLst>
               <a:ext uri="{91240B29-F687-4f45-9708-019B960494DF}">
-                <a14:hiddenLine xmlns:a14="http://schemas.microsoft.com/office/drawing/2010/main" xmlns="" w="9525">
+                <a14:hiddenLine xmlns="" xmlns:a14="http://schemas.microsoft.com/office/drawing/2010/main" w="9525">
                   <a:solidFill>
                     <a:srgbClr val="000000"/>
                   </a:solidFill>
@@ -3369,7 +3369,7 @@
             </a:ln>
             <a:extLst>
               <a:ext uri="{91240B29-F687-4f45-9708-019B960494DF}">
-                <a14:hiddenLine xmlns:a14="http://schemas.microsoft.com/office/drawing/2010/main" xmlns="" w="9525">
+                <a14:hiddenLine xmlns="" xmlns:a14="http://schemas.microsoft.com/office/drawing/2010/main" w="9525">
                   <a:solidFill>
                     <a:srgbClr val="000000"/>
                   </a:solidFill>
@@ -3431,7 +3431,7 @@
             </a:ln>
             <a:extLst>
               <a:ext uri="{91240B29-F687-4f45-9708-019B960494DF}">
-                <a14:hiddenLine xmlns:a14="http://schemas.microsoft.com/office/drawing/2010/main" xmlns="" w="9525">
+                <a14:hiddenLine xmlns="" xmlns:a14="http://schemas.microsoft.com/office/drawing/2010/main" w="9525">
                   <a:solidFill>
                     <a:srgbClr val="000000"/>
                   </a:solidFill>
@@ -3521,7 +3521,7 @@
             </a:ln>
             <a:extLst>
               <a:ext uri="{91240B29-F687-4f45-9708-019B960494DF}">
-                <a14:hiddenLine xmlns:a14="http://schemas.microsoft.com/office/drawing/2010/main" xmlns="" w="9525">
+                <a14:hiddenLine xmlns="" xmlns:a14="http://schemas.microsoft.com/office/drawing/2010/main" w="9525">
                   <a:solidFill>
                     <a:srgbClr val="000000"/>
                   </a:solidFill>
@@ -3589,7 +3589,7 @@
             </a:ln>
             <a:extLst>
               <a:ext uri="{91240B29-F687-4f45-9708-019B960494DF}">
-                <a14:hiddenLine xmlns:a14="http://schemas.microsoft.com/office/drawing/2010/main" xmlns="" w="9525">
+                <a14:hiddenLine xmlns="" xmlns:a14="http://schemas.microsoft.com/office/drawing/2010/main" w="9525">
                   <a:solidFill>
                     <a:srgbClr val="000000"/>
                   </a:solidFill>
@@ -3651,7 +3651,7 @@
             </a:ln>
             <a:extLst>
               <a:ext uri="{91240B29-F687-4f45-9708-019B960494DF}">
-                <a14:hiddenLine xmlns:a14="http://schemas.microsoft.com/office/drawing/2010/main" xmlns="" w="9525">
+                <a14:hiddenLine xmlns="" xmlns:a14="http://schemas.microsoft.com/office/drawing/2010/main" w="9525">
                   <a:solidFill>
                     <a:srgbClr val="000000"/>
                   </a:solidFill>
@@ -3741,7 +3741,7 @@
             </a:ln>
             <a:extLst>
               <a:ext uri="{91240B29-F687-4f45-9708-019B960494DF}">
-                <a14:hiddenLine xmlns:a14="http://schemas.microsoft.com/office/drawing/2010/main" xmlns="" w="9525">
+                <a14:hiddenLine xmlns="" xmlns:a14="http://schemas.microsoft.com/office/drawing/2010/main" w="9525">
                   <a:solidFill>
                     <a:srgbClr val="000000"/>
                   </a:solidFill>
@@ -3803,7 +3803,7 @@
             </a:ln>
             <a:extLst>
               <a:ext uri="{91240B29-F687-4f45-9708-019B960494DF}">
-                <a14:hiddenLine xmlns:a14="http://schemas.microsoft.com/office/drawing/2010/main" xmlns="" w="9525">
+                <a14:hiddenLine xmlns="" xmlns:a14="http://schemas.microsoft.com/office/drawing/2010/main" w="9525">
                   <a:solidFill>
                     <a:srgbClr val="000000"/>
                   </a:solidFill>
@@ -3893,7 +3893,7 @@
             </a:ln>
             <a:extLst>
               <a:ext uri="{91240B29-F687-4f45-9708-019B960494DF}">
-                <a14:hiddenLine xmlns:a14="http://schemas.microsoft.com/office/drawing/2010/main" xmlns="" w="9525">
+                <a14:hiddenLine xmlns="" xmlns:a14="http://schemas.microsoft.com/office/drawing/2010/main" w="9525">
                   <a:solidFill>
                     <a:srgbClr val="000000"/>
                   </a:solidFill>
@@ -3955,7 +3955,7 @@
             </a:ln>
             <a:extLst>
               <a:ext uri="{91240B29-F687-4f45-9708-019B960494DF}">
-                <a14:hiddenLine xmlns:a14="http://schemas.microsoft.com/office/drawing/2010/main" xmlns="" w="9525">
+                <a14:hiddenLine xmlns="" xmlns:a14="http://schemas.microsoft.com/office/drawing/2010/main" w="9525">
                   <a:solidFill>
                     <a:srgbClr val="000000"/>
                   </a:solidFill>
@@ -4045,7 +4045,7 @@
             </a:ln>
             <a:extLst>
               <a:ext uri="{91240B29-F687-4f45-9708-019B960494DF}">
-                <a14:hiddenLine xmlns:a14="http://schemas.microsoft.com/office/drawing/2010/main" xmlns="" w="9525">
+                <a14:hiddenLine xmlns="" xmlns:a14="http://schemas.microsoft.com/office/drawing/2010/main" w="9525">
                   <a:solidFill>
                     <a:srgbClr val="000000"/>
                   </a:solidFill>
@@ -4079,7 +4079,7 @@
             </a:ln>
             <a:extLst>
               <a:ext uri="{91240B29-F687-4f45-9708-019B960494DF}">
-                <a14:hiddenLine xmlns:a14="http://schemas.microsoft.com/office/drawing/2010/main" xmlns="" w="9525">
+                <a14:hiddenLine xmlns="" xmlns:a14="http://schemas.microsoft.com/office/drawing/2010/main" w="9525">
                   <a:solidFill>
                     <a:srgbClr val="000000"/>
                   </a:solidFill>
@@ -4144,7 +4144,7 @@
             </a:ln>
             <a:extLst>
               <a:ext uri="{91240B29-F687-4f45-9708-019B960494DF}">
-                <a14:hiddenLine xmlns:a14="http://schemas.microsoft.com/office/drawing/2010/main" xmlns="" w="9525">
+                <a14:hiddenLine xmlns="" xmlns:a14="http://schemas.microsoft.com/office/drawing/2010/main" w="9525">
                   <a:solidFill>
                     <a:srgbClr val="000000"/>
                   </a:solidFill>
@@ -4234,7 +4234,7 @@
             </a:ln>
             <a:extLst>
               <a:ext uri="{91240B29-F687-4f45-9708-019B960494DF}">
-                <a14:hiddenLine xmlns:a14="http://schemas.microsoft.com/office/drawing/2010/main" xmlns="" w="9525">
+                <a14:hiddenLine xmlns="" xmlns:a14="http://schemas.microsoft.com/office/drawing/2010/main" w="9525">
                   <a:solidFill>
                     <a:srgbClr val="000000"/>
                   </a:solidFill>
@@ -4296,7 +4296,7 @@
             </a:ln>
             <a:extLst>
               <a:ext uri="{91240B29-F687-4f45-9708-019B960494DF}">
-                <a14:hiddenLine xmlns:a14="http://schemas.microsoft.com/office/drawing/2010/main" xmlns="" w="9525">
+                <a14:hiddenLine xmlns="" xmlns:a14="http://schemas.microsoft.com/office/drawing/2010/main" w="9525">
                   <a:solidFill>
                     <a:srgbClr val="000000"/>
                   </a:solidFill>
@@ -4386,7 +4386,7 @@
             </a:ln>
             <a:extLst>
               <a:ext uri="{91240B29-F687-4f45-9708-019B960494DF}">
-                <a14:hiddenLine xmlns:a14="http://schemas.microsoft.com/office/drawing/2010/main" xmlns="" w="9525">
+                <a14:hiddenLine xmlns="" xmlns:a14="http://schemas.microsoft.com/office/drawing/2010/main" w="9525">
                   <a:solidFill>
                     <a:srgbClr val="000000"/>
                   </a:solidFill>
@@ -4476,7 +4476,7 @@
             </a:ln>
             <a:extLst>
               <a:ext uri="{91240B29-F687-4f45-9708-019B960494DF}">
-                <a14:hiddenLine xmlns:a14="http://schemas.microsoft.com/office/drawing/2010/main" xmlns="" w="9525">
+                <a14:hiddenLine xmlns="" xmlns:a14="http://schemas.microsoft.com/office/drawing/2010/main" w="9525">
                   <a:solidFill>
                     <a:srgbClr val="000000"/>
                   </a:solidFill>
@@ -4541,7 +4541,7 @@
             </a:ln>
             <a:extLst>
               <a:ext uri="{91240B29-F687-4f45-9708-019B960494DF}">
-                <a14:hiddenLine xmlns:a14="http://schemas.microsoft.com/office/drawing/2010/main" xmlns="" w="9525">
+                <a14:hiddenLine xmlns="" xmlns:a14="http://schemas.microsoft.com/office/drawing/2010/main" w="9525">
                   <a:solidFill>
                     <a:srgbClr val="000000"/>
                   </a:solidFill>
@@ -4603,7 +4603,7 @@
             </a:ln>
             <a:extLst>
               <a:ext uri="{91240B29-F687-4f45-9708-019B960494DF}">
-                <a14:hiddenLine xmlns:a14="http://schemas.microsoft.com/office/drawing/2010/main" xmlns="" w="9525">
+                <a14:hiddenLine xmlns="" xmlns:a14="http://schemas.microsoft.com/office/drawing/2010/main" w="9525">
                   <a:solidFill>
                     <a:srgbClr val="000000"/>
                   </a:solidFill>
@@ -4693,7 +4693,7 @@
             </a:ln>
             <a:extLst>
               <a:ext uri="{91240B29-F687-4f45-9708-019B960494DF}">
-                <a14:hiddenLine xmlns:a14="http://schemas.microsoft.com/office/drawing/2010/main" xmlns="" w="9525">
+                <a14:hiddenLine xmlns="" xmlns:a14="http://schemas.microsoft.com/office/drawing/2010/main" w="9525">
                   <a:solidFill>
                     <a:srgbClr val="000000"/>
                   </a:solidFill>
@@ -4783,7 +4783,7 @@
             </a:ln>
             <a:extLst>
               <a:ext uri="{91240B29-F687-4f45-9708-019B960494DF}">
-                <a14:hiddenLine xmlns:a14="http://schemas.microsoft.com/office/drawing/2010/main" xmlns="" w="9525">
+                <a14:hiddenLine xmlns="" xmlns:a14="http://schemas.microsoft.com/office/drawing/2010/main" w="9525">
                   <a:solidFill>
                     <a:srgbClr val="000000"/>
                   </a:solidFill>
@@ -4845,7 +4845,7 @@
             </a:ln>
             <a:extLst>
               <a:ext uri="{91240B29-F687-4f45-9708-019B960494DF}">
-                <a14:hiddenLine xmlns:a14="http://schemas.microsoft.com/office/drawing/2010/main" xmlns="" w="9525">
+                <a14:hiddenLine xmlns="" xmlns:a14="http://schemas.microsoft.com/office/drawing/2010/main" w="9525">
                   <a:solidFill>
                     <a:srgbClr val="000000"/>
                   </a:solidFill>
@@ -4965,7 +4965,7 @@
             </a:ln>
             <a:extLst>
               <a:ext uri="{91240B29-F687-4f45-9708-019B960494DF}">
-                <a14:hiddenLine xmlns:a14="http://schemas.microsoft.com/office/drawing/2010/main" xmlns="" w="9525">
+                <a14:hiddenLine xmlns="" xmlns:a14="http://schemas.microsoft.com/office/drawing/2010/main" w="9525">
                   <a:solidFill>
                     <a:srgbClr val="000000"/>
                   </a:solidFill>
@@ -5033,7 +5033,7 @@
             </a:ln>
             <a:extLst>
               <a:ext uri="{91240B29-F687-4f45-9708-019B960494DF}">
-                <a14:hiddenLine xmlns:a14="http://schemas.microsoft.com/office/drawing/2010/main" xmlns="" w="9525">
+                <a14:hiddenLine xmlns="" xmlns:a14="http://schemas.microsoft.com/office/drawing/2010/main" w="9525">
                   <a:solidFill>
                     <a:srgbClr val="000000"/>
                   </a:solidFill>
@@ -5123,7 +5123,7 @@
             </a:ln>
             <a:extLst>
               <a:ext uri="{91240B29-F687-4f45-9708-019B960494DF}">
-                <a14:hiddenLine xmlns:a14="http://schemas.microsoft.com/office/drawing/2010/main" xmlns="" w="9525">
+                <a14:hiddenLine xmlns="" xmlns:a14="http://schemas.microsoft.com/office/drawing/2010/main" w="9525">
                   <a:solidFill>
                     <a:srgbClr val="000000"/>
                   </a:solidFill>
@@ -9852,7 +9852,7 @@
           <a:noFill/>
           <a:extLst>
             <a:ext uri="{909E8E84-426E-40dd-AFC4-6F175D3DCCD1}">
-              <a14:hiddenFill xmlns:a14="http://schemas.microsoft.com/office/drawing/2010/main" xmlns="">
+              <a14:hiddenFill xmlns="" xmlns:a14="http://schemas.microsoft.com/office/drawing/2010/main">
                 <a:solidFill>
                   <a:srgbClr val="FFFFFF"/>
                 </a:solidFill>
@@ -9926,7 +9926,7 @@
               </a:ln>
               <a:extLst>
                 <a:ext uri="{91240B29-F687-4f45-9708-019B960494DF}">
-                  <a14:hiddenLine xmlns:a14="http://schemas.microsoft.com/office/drawing/2010/main" xmlns="" w="9525">
+                  <a14:hiddenLine xmlns="" xmlns:a14="http://schemas.microsoft.com/office/drawing/2010/main" w="9525">
                     <a:solidFill>
                       <a:srgbClr val="000000"/>
                     </a:solidFill>
@@ -10016,7 +10016,7 @@
               </a:ln>
               <a:extLst>
                 <a:ext uri="{91240B29-F687-4f45-9708-019B960494DF}">
-                  <a14:hiddenLine xmlns:a14="http://schemas.microsoft.com/office/drawing/2010/main" xmlns="" w="9525">
+                  <a14:hiddenLine xmlns="" xmlns:a14="http://schemas.microsoft.com/office/drawing/2010/main" w="9525">
                     <a:solidFill>
                       <a:srgbClr val="000000"/>
                     </a:solidFill>
@@ -10106,7 +10106,7 @@
               </a:ln>
               <a:extLst>
                 <a:ext uri="{91240B29-F687-4f45-9708-019B960494DF}">
-                  <a14:hiddenLine xmlns:a14="http://schemas.microsoft.com/office/drawing/2010/main" xmlns="" w="9525">
+                  <a14:hiddenLine xmlns="" xmlns:a14="http://schemas.microsoft.com/office/drawing/2010/main" w="9525">
                     <a:solidFill>
                       <a:srgbClr val="000000"/>
                     </a:solidFill>
@@ -10168,7 +10168,7 @@
               </a:ln>
               <a:extLst>
                 <a:ext uri="{91240B29-F687-4f45-9708-019B960494DF}">
-                  <a14:hiddenLine xmlns:a14="http://schemas.microsoft.com/office/drawing/2010/main" xmlns="" w="9525">
+                  <a14:hiddenLine xmlns="" xmlns:a14="http://schemas.microsoft.com/office/drawing/2010/main" w="9525">
                     <a:solidFill>
                       <a:srgbClr val="000000"/>
                     </a:solidFill>
@@ -10258,7 +10258,7 @@
               </a:ln>
               <a:extLst>
                 <a:ext uri="{91240B29-F687-4f45-9708-019B960494DF}">
-                  <a14:hiddenLine xmlns:a14="http://schemas.microsoft.com/office/drawing/2010/main" xmlns="" w="9525">
+                  <a14:hiddenLine xmlns="" xmlns:a14="http://schemas.microsoft.com/office/drawing/2010/main" w="9525">
                     <a:solidFill>
                       <a:srgbClr val="000000"/>
                     </a:solidFill>
@@ -10320,7 +10320,7 @@
               </a:ln>
               <a:extLst>
                 <a:ext uri="{91240B29-F687-4f45-9708-019B960494DF}">
-                  <a14:hiddenLine xmlns:a14="http://schemas.microsoft.com/office/drawing/2010/main" xmlns="" w="9525">
+                  <a14:hiddenLine xmlns="" xmlns:a14="http://schemas.microsoft.com/office/drawing/2010/main" w="9525">
                     <a:solidFill>
                       <a:srgbClr val="000000"/>
                     </a:solidFill>
@@ -10382,7 +10382,7 @@
               </a:ln>
               <a:extLst>
                 <a:ext uri="{91240B29-F687-4f45-9708-019B960494DF}">
-                  <a14:hiddenLine xmlns:a14="http://schemas.microsoft.com/office/drawing/2010/main" xmlns="" w="9525">
+                  <a14:hiddenLine xmlns="" xmlns:a14="http://schemas.microsoft.com/office/drawing/2010/main" w="9525">
                     <a:solidFill>
                       <a:srgbClr val="000000"/>
                     </a:solidFill>
@@ -10472,7 +10472,7 @@
               </a:ln>
               <a:extLst>
                 <a:ext uri="{91240B29-F687-4f45-9708-019B960494DF}">
-                  <a14:hiddenLine xmlns:a14="http://schemas.microsoft.com/office/drawing/2010/main" xmlns="" w="9525">
+                  <a14:hiddenLine xmlns="" xmlns:a14="http://schemas.microsoft.com/office/drawing/2010/main" w="9525">
                     <a:solidFill>
                       <a:srgbClr val="000000"/>
                     </a:solidFill>
@@ -10562,7 +10562,7 @@
               </a:ln>
               <a:extLst>
                 <a:ext uri="{91240B29-F687-4f45-9708-019B960494DF}">
-                  <a14:hiddenLine xmlns:a14="http://schemas.microsoft.com/office/drawing/2010/main" xmlns="" w="9525">
+                  <a14:hiddenLine xmlns="" xmlns:a14="http://schemas.microsoft.com/office/drawing/2010/main" w="9525">
                     <a:solidFill>
                       <a:srgbClr val="000000"/>
                     </a:solidFill>
@@ -10624,7 +10624,7 @@
               </a:ln>
               <a:extLst>
                 <a:ext uri="{91240B29-F687-4f45-9708-019B960494DF}">
-                  <a14:hiddenLine xmlns:a14="http://schemas.microsoft.com/office/drawing/2010/main" xmlns="" w="9525">
+                  <a14:hiddenLine xmlns="" xmlns:a14="http://schemas.microsoft.com/office/drawing/2010/main" w="9525">
                     <a:solidFill>
                       <a:srgbClr val="000000"/>
                     </a:solidFill>
@@ -10734,7 +10734,7 @@
               </a:ln>
               <a:extLst>
                 <a:ext uri="{91240B29-F687-4f45-9708-019B960494DF}">
-                  <a14:hiddenLine xmlns:a14="http://schemas.microsoft.com/office/drawing/2010/main" xmlns="" w="9525">
+                  <a14:hiddenLine xmlns="" xmlns:a14="http://schemas.microsoft.com/office/drawing/2010/main" w="9525">
                     <a:solidFill>
                       <a:srgbClr val="000000"/>
                     </a:solidFill>
@@ -10818,7 +10818,7 @@
               </a:ln>
               <a:extLst>
                 <a:ext uri="{91240B29-F687-4f45-9708-019B960494DF}">
-                  <a14:hiddenLine xmlns:a14="http://schemas.microsoft.com/office/drawing/2010/main" xmlns="" w="9525">
+                  <a14:hiddenLine xmlns="" xmlns:a14="http://schemas.microsoft.com/office/drawing/2010/main" w="9525">
                     <a:solidFill>
                       <a:srgbClr val="000000"/>
                     </a:solidFill>
@@ -10880,7 +10880,7 @@
               </a:ln>
               <a:extLst>
                 <a:ext uri="{91240B29-F687-4f45-9708-019B960494DF}">
-                  <a14:hiddenLine xmlns:a14="http://schemas.microsoft.com/office/drawing/2010/main" xmlns="" w="9525">
+                  <a14:hiddenLine xmlns="" xmlns:a14="http://schemas.microsoft.com/office/drawing/2010/main" w="9525">
                     <a:solidFill>
                       <a:srgbClr val="000000"/>
                     </a:solidFill>
@@ -10942,7 +10942,7 @@
               </a:ln>
               <a:extLst>
                 <a:ext uri="{91240B29-F687-4f45-9708-019B960494DF}">
-                  <a14:hiddenLine xmlns:a14="http://schemas.microsoft.com/office/drawing/2010/main" xmlns="" w="9525">
+                  <a14:hiddenLine xmlns="" xmlns:a14="http://schemas.microsoft.com/office/drawing/2010/main" w="9525">
                     <a:solidFill>
                       <a:srgbClr val="000000"/>
                     </a:solidFill>
@@ -11032,7 +11032,7 @@
               </a:ln>
               <a:extLst>
                 <a:ext uri="{91240B29-F687-4f45-9708-019B960494DF}">
-                  <a14:hiddenLine xmlns:a14="http://schemas.microsoft.com/office/drawing/2010/main" xmlns="" w="9525">
+                  <a14:hiddenLine xmlns="" xmlns:a14="http://schemas.microsoft.com/office/drawing/2010/main" w="9525">
                     <a:solidFill>
                       <a:srgbClr val="000000"/>
                     </a:solidFill>
@@ -11066,7 +11066,7 @@
               </a:ln>
               <a:extLst>
                 <a:ext uri="{91240B29-F687-4f45-9708-019B960494DF}">
-                  <a14:hiddenLine xmlns:a14="http://schemas.microsoft.com/office/drawing/2010/main" xmlns="" w="9525">
+                  <a14:hiddenLine xmlns="" xmlns:a14="http://schemas.microsoft.com/office/drawing/2010/main" w="9525">
                     <a:solidFill>
                       <a:srgbClr val="000000"/>
                     </a:solidFill>
@@ -11131,7 +11131,7 @@
               </a:ln>
               <a:extLst>
                 <a:ext uri="{91240B29-F687-4f45-9708-019B960494DF}">
-                  <a14:hiddenLine xmlns:a14="http://schemas.microsoft.com/office/drawing/2010/main" xmlns="" w="9525">
+                  <a14:hiddenLine xmlns="" xmlns:a14="http://schemas.microsoft.com/office/drawing/2010/main" w="9525">
                     <a:solidFill>
                       <a:srgbClr val="000000"/>
                     </a:solidFill>
@@ -11221,7 +11221,7 @@
               </a:ln>
               <a:extLst>
                 <a:ext uri="{91240B29-F687-4f45-9708-019B960494DF}">
-                  <a14:hiddenLine xmlns:a14="http://schemas.microsoft.com/office/drawing/2010/main" xmlns="" w="9525">
+                  <a14:hiddenLine xmlns="" xmlns:a14="http://schemas.microsoft.com/office/drawing/2010/main" w="9525">
                     <a:solidFill>
                       <a:srgbClr val="000000"/>
                     </a:solidFill>
@@ -11283,7 +11283,7 @@
               </a:ln>
               <a:extLst>
                 <a:ext uri="{91240B29-F687-4f45-9708-019B960494DF}">
-                  <a14:hiddenLine xmlns:a14="http://schemas.microsoft.com/office/drawing/2010/main" xmlns="" w="9525">
+                  <a14:hiddenLine xmlns="" xmlns:a14="http://schemas.microsoft.com/office/drawing/2010/main" w="9525">
                     <a:solidFill>
                       <a:srgbClr val="000000"/>
                     </a:solidFill>
@@ -11373,7 +11373,7 @@
               </a:ln>
               <a:extLst>
                 <a:ext uri="{91240B29-F687-4f45-9708-019B960494DF}">
-                  <a14:hiddenLine xmlns:a14="http://schemas.microsoft.com/office/drawing/2010/main" xmlns="" w="9525">
+                  <a14:hiddenLine xmlns="" xmlns:a14="http://schemas.microsoft.com/office/drawing/2010/main" w="9525">
                     <a:solidFill>
                       <a:srgbClr val="000000"/>
                     </a:solidFill>
@@ -11438,7 +11438,7 @@
               </a:ln>
               <a:extLst>
                 <a:ext uri="{91240B29-F687-4f45-9708-019B960494DF}">
-                  <a14:hiddenLine xmlns:a14="http://schemas.microsoft.com/office/drawing/2010/main" xmlns="" w="9525">
+                  <a14:hiddenLine xmlns="" xmlns:a14="http://schemas.microsoft.com/office/drawing/2010/main" w="9525">
                     <a:solidFill>
                       <a:srgbClr val="000000"/>
                     </a:solidFill>
@@ -11500,7 +11500,7 @@
               </a:ln>
               <a:extLst>
                 <a:ext uri="{91240B29-F687-4f45-9708-019B960494DF}">
-                  <a14:hiddenLine xmlns:a14="http://schemas.microsoft.com/office/drawing/2010/main" xmlns="" w="9525">
+                  <a14:hiddenLine xmlns="" xmlns:a14="http://schemas.microsoft.com/office/drawing/2010/main" w="9525">
                     <a:solidFill>
                       <a:srgbClr val="000000"/>
                     </a:solidFill>
@@ -11590,7 +11590,7 @@
               </a:ln>
               <a:extLst>
                 <a:ext uri="{91240B29-F687-4f45-9708-019B960494DF}">
-                  <a14:hiddenLine xmlns:a14="http://schemas.microsoft.com/office/drawing/2010/main" xmlns="" w="9525">
+                  <a14:hiddenLine xmlns="" xmlns:a14="http://schemas.microsoft.com/office/drawing/2010/main" w="9525">
                     <a:solidFill>
                       <a:srgbClr val="000000"/>
                     </a:solidFill>
@@ -11680,7 +11680,7 @@
               </a:ln>
               <a:extLst>
                 <a:ext uri="{91240B29-F687-4f45-9708-019B960494DF}">
-                  <a14:hiddenLine xmlns:a14="http://schemas.microsoft.com/office/drawing/2010/main" xmlns="" w="9525">
+                  <a14:hiddenLine xmlns="" xmlns:a14="http://schemas.microsoft.com/office/drawing/2010/main" w="9525">
                     <a:solidFill>
                       <a:srgbClr val="000000"/>
                     </a:solidFill>
@@ -11745,7 +11745,7 @@
               </a:ln>
               <a:extLst>
                 <a:ext uri="{91240B29-F687-4f45-9708-019B960494DF}">
-                  <a14:hiddenLine xmlns:a14="http://schemas.microsoft.com/office/drawing/2010/main" xmlns="" w="9525">
+                  <a14:hiddenLine xmlns="" xmlns:a14="http://schemas.microsoft.com/office/drawing/2010/main" w="9525">
                     <a:solidFill>
                       <a:srgbClr val="000000"/>
                     </a:solidFill>
@@ -11865,7 +11865,7 @@
               </a:ln>
               <a:extLst>
                 <a:ext uri="{91240B29-F687-4f45-9708-019B960494DF}">
-                  <a14:hiddenLine xmlns:a14="http://schemas.microsoft.com/office/drawing/2010/main" xmlns="" w="9525">
+                  <a14:hiddenLine xmlns="" xmlns:a14="http://schemas.microsoft.com/office/drawing/2010/main" w="9525">
                     <a:solidFill>
                       <a:srgbClr val="000000"/>
                     </a:solidFill>
@@ -11946,7 +11946,7 @@
               </a:ln>
               <a:extLst>
                 <a:ext uri="{91240B29-F687-4f45-9708-019B960494DF}">
-                  <a14:hiddenLine xmlns:a14="http://schemas.microsoft.com/office/drawing/2010/main" xmlns="" w="9525">
+                  <a14:hiddenLine xmlns="" xmlns:a14="http://schemas.microsoft.com/office/drawing/2010/main" w="9525">
                     <a:solidFill>
                       <a:srgbClr val="000000"/>
                     </a:solidFill>
@@ -12061,7 +12061,7 @@
               </a:ln>
               <a:extLst>
                 <a:ext uri="{91240B29-F687-4f45-9708-019B960494DF}">
-                  <a14:hiddenLine xmlns:a14="http://schemas.microsoft.com/office/drawing/2010/main" xmlns="" w="9525">
+                  <a14:hiddenLine xmlns="" xmlns:a14="http://schemas.microsoft.com/office/drawing/2010/main" w="9525">
                     <a:solidFill>
                       <a:srgbClr val="000000"/>
                     </a:solidFill>
@@ -12151,7 +12151,7 @@
               </a:ln>
               <a:extLst>
                 <a:ext uri="{91240B29-F687-4f45-9708-019B960494DF}">
-                  <a14:hiddenLine xmlns:a14="http://schemas.microsoft.com/office/drawing/2010/main" xmlns="" w="9525">
+                  <a14:hiddenLine xmlns="" xmlns:a14="http://schemas.microsoft.com/office/drawing/2010/main" w="9525">
                     <a:solidFill>
                       <a:srgbClr val="000000"/>
                     </a:solidFill>
@@ -12216,7 +12216,7 @@
               </a:ln>
               <a:extLst>
                 <a:ext uri="{91240B29-F687-4f45-9708-019B960494DF}">
-                  <a14:hiddenLine xmlns:a14="http://schemas.microsoft.com/office/drawing/2010/main" xmlns="" w="9525">
+                  <a14:hiddenLine xmlns="" xmlns:a14="http://schemas.microsoft.com/office/drawing/2010/main" w="9525">
                     <a:solidFill>
                       <a:srgbClr val="000000"/>
                     </a:solidFill>
@@ -12306,7 +12306,7 @@
               </a:ln>
               <a:extLst>
                 <a:ext uri="{91240B29-F687-4f45-9708-019B960494DF}">
-                  <a14:hiddenLine xmlns:a14="http://schemas.microsoft.com/office/drawing/2010/main" xmlns="" w="9525">
+                  <a14:hiddenLine xmlns="" xmlns:a14="http://schemas.microsoft.com/office/drawing/2010/main" w="9525">
                     <a:solidFill>
                       <a:srgbClr val="000000"/>
                     </a:solidFill>
@@ -12374,7 +12374,7 @@
               </a:ln>
               <a:extLst>
                 <a:ext uri="{91240B29-F687-4f45-9708-019B960494DF}">
-                  <a14:hiddenLine xmlns:a14="http://schemas.microsoft.com/office/drawing/2010/main" xmlns="" w="9525">
+                  <a14:hiddenLine xmlns="" xmlns:a14="http://schemas.microsoft.com/office/drawing/2010/main" w="9525">
                     <a:solidFill>
                       <a:srgbClr val="000000"/>
                     </a:solidFill>
@@ -12464,7 +12464,7 @@
               </a:ln>
               <a:extLst>
                 <a:ext uri="{91240B29-F687-4f45-9708-019B960494DF}">
-                  <a14:hiddenLine xmlns:a14="http://schemas.microsoft.com/office/drawing/2010/main" xmlns="" w="9525">
+                  <a14:hiddenLine xmlns="" xmlns:a14="http://schemas.microsoft.com/office/drawing/2010/main" w="9525">
                     <a:solidFill>
                       <a:srgbClr val="000000"/>
                     </a:solidFill>
@@ -12532,7 +12532,7 @@
               </a:ln>
               <a:extLst>
                 <a:ext uri="{91240B29-F687-4f45-9708-019B960494DF}">
-                  <a14:hiddenLine xmlns:a14="http://schemas.microsoft.com/office/drawing/2010/main" xmlns="" w="9525">
+                  <a14:hiddenLine xmlns="" xmlns:a14="http://schemas.microsoft.com/office/drawing/2010/main" w="9525">
                     <a:solidFill>
                       <a:srgbClr val="000000"/>
                     </a:solidFill>
@@ -12622,7 +12622,7 @@
               </a:ln>
               <a:extLst>
                 <a:ext uri="{91240B29-F687-4f45-9708-019B960494DF}">
-                  <a14:hiddenLine xmlns:a14="http://schemas.microsoft.com/office/drawing/2010/main" xmlns="" w="9525">
+                  <a14:hiddenLine xmlns="" xmlns:a14="http://schemas.microsoft.com/office/drawing/2010/main" w="9525">
                     <a:solidFill>
                       <a:srgbClr val="000000"/>
                     </a:solidFill>
@@ -12656,7 +12656,7 @@
               </a:ln>
               <a:extLst>
                 <a:ext uri="{91240B29-F687-4f45-9708-019B960494DF}">
-                  <a14:hiddenLine xmlns:a14="http://schemas.microsoft.com/office/drawing/2010/main" xmlns="" w="9525">
+                  <a14:hiddenLine xmlns="" xmlns:a14="http://schemas.microsoft.com/office/drawing/2010/main" w="9525">
                     <a:solidFill>
                       <a:srgbClr val="000000"/>
                     </a:solidFill>
@@ -14031,19 +14031,19 @@
           <a:p>
             <a:r>
               <a:rPr lang="en-US" dirty="0"/>
-              <a:t>The subclass objects can’t override some of the template method calls?</a:t>
+              <a:t>Subclass objects can’t override some of the template method call.  (True/False)</a:t>
             </a:r>
           </a:p>
           <a:p>
             <a:r>
               <a:rPr lang="en-US" dirty="0"/>
-              <a:t>The template method cannot be define in the abstract class?</a:t>
+              <a:t>The template method cannot be define in the abstract class.           (True/False)</a:t>
             </a:r>
           </a:p>
           <a:p>
             <a:r>
               <a:rPr lang="en-US" dirty="0"/>
-              <a:t>Why we don’t need template method if the subclasses will not be calling similar calls?</a:t>
+              <a:t>Why don’t we need template method if the subclasses will not be making similar calls?</a:t>
             </a:r>
           </a:p>
           <a:p>

</xml_diff>